<commit_message>
dev分支 by yipin 2021-06-29
</commit_message>
<xml_diff>
--- a/doc/I:O简介.pptx
+++ b/doc/I:O简介.pptx
@@ -17,6 +17,7 @@
     <p:sldId id="265" r:id="rId11"/>
     <p:sldId id="266" r:id="rId12"/>
     <p:sldId id="267" r:id="rId13"/>
+    <p:sldId id="268" r:id="rId14"/>
   </p:sldIdLst>
   <p:sldSz cx="12192000" cy="6858000"/>
   <p:notesSz cx="6858000" cy="9144000"/>
@@ -312,7 +313,7 @@
             <a:fld id="{B61BEF0D-F0BB-DE4B-95CE-6DB70DBA9567}" type="datetimeFigureOut">
               <a:rPr lang="en-US" dirty="0"/>
               <a:pPr/>
-              <a:t>6/29/21</a:t>
+              <a:t>6/30/21</a:t>
             </a:fld>
             <a:endParaRPr lang="en-US" dirty="0"/>
           </a:p>
@@ -647,7 +648,7 @@
             <a:fld id="{B61BEF0D-F0BB-DE4B-95CE-6DB70DBA9567}" type="datetimeFigureOut">
               <a:rPr lang="en-US" dirty="0"/>
               <a:pPr/>
-              <a:t>6/29/21</a:t>
+              <a:t>6/30/21</a:t>
             </a:fld>
             <a:endParaRPr lang="en-US" dirty="0"/>
           </a:p>
@@ -1045,7 +1046,7 @@
             <a:fld id="{B61BEF0D-F0BB-DE4B-95CE-6DB70DBA9567}" type="datetimeFigureOut">
               <a:rPr lang="en-US" dirty="0"/>
               <a:pPr/>
-              <a:t>6/29/21</a:t>
+              <a:t>6/30/21</a:t>
             </a:fld>
             <a:endParaRPr lang="en-US" dirty="0"/>
           </a:p>
@@ -1378,7 +1379,7 @@
             <a:fld id="{B61BEF0D-F0BB-DE4B-95CE-6DB70DBA9567}" type="datetimeFigureOut">
               <a:rPr lang="en-US" dirty="0"/>
               <a:pPr/>
-              <a:t>6/29/21</a:t>
+              <a:t>6/30/21</a:t>
             </a:fld>
             <a:endParaRPr lang="en-US" dirty="0"/>
           </a:p>
@@ -1695,7 +1696,7 @@
             <a:fld id="{B61BEF0D-F0BB-DE4B-95CE-6DB70DBA9567}" type="datetimeFigureOut">
               <a:rPr lang="en-US" dirty="0"/>
               <a:pPr/>
-              <a:t>6/29/21</a:t>
+              <a:t>6/30/21</a:t>
             </a:fld>
             <a:endParaRPr lang="en-US" dirty="0"/>
           </a:p>
@@ -2088,7 +2089,7 @@
             <a:fld id="{B61BEF0D-F0BB-DE4B-95CE-6DB70DBA9567}" type="datetimeFigureOut">
               <a:rPr lang="en-US" dirty="0"/>
               <a:pPr/>
-              <a:t>6/29/21</a:t>
+              <a:t>6/30/21</a:t>
             </a:fld>
             <a:endParaRPr lang="en-US" dirty="0"/>
           </a:p>
@@ -2342,7 +2343,7 @@
             <a:fld id="{B61BEF0D-F0BB-DE4B-95CE-6DB70DBA9567}" type="datetimeFigureOut">
               <a:rPr lang="en-US" dirty="0"/>
               <a:pPr/>
-              <a:t>6/29/21</a:t>
+              <a:t>6/30/21</a:t>
             </a:fld>
             <a:endParaRPr lang="en-US" dirty="0"/>
           </a:p>
@@ -2601,7 +2602,7 @@
             <a:fld id="{B61BEF0D-F0BB-DE4B-95CE-6DB70DBA9567}" type="datetimeFigureOut">
               <a:rPr lang="en-US" dirty="0"/>
               <a:pPr/>
-              <a:t>6/29/21</a:t>
+              <a:t>6/30/21</a:t>
             </a:fld>
             <a:endParaRPr lang="en-US" dirty="0"/>
           </a:p>
@@ -2860,7 +2861,7 @@
             <a:fld id="{B61BEF0D-F0BB-DE4B-95CE-6DB70DBA9567}" type="datetimeFigureOut">
               <a:rPr lang="en-US" dirty="0"/>
               <a:pPr/>
-              <a:t>6/29/21</a:t>
+              <a:t>6/30/21</a:t>
             </a:fld>
             <a:endParaRPr lang="en-US" dirty="0"/>
           </a:p>
@@ -3186,7 +3187,7 @@
             <a:fld id="{B61BEF0D-F0BB-DE4B-95CE-6DB70DBA9567}" type="datetimeFigureOut">
               <a:rPr lang="en-US" dirty="0"/>
               <a:pPr/>
-              <a:t>6/29/21</a:t>
+              <a:t>6/30/21</a:t>
             </a:fld>
             <a:endParaRPr lang="en-US" dirty="0"/>
           </a:p>
@@ -3506,7 +3507,7 @@
             <a:fld id="{B61BEF0D-F0BB-DE4B-95CE-6DB70DBA9567}" type="datetimeFigureOut">
               <a:rPr lang="en-US" dirty="0"/>
               <a:pPr/>
-              <a:t>6/29/21</a:t>
+              <a:t>6/30/21</a:t>
             </a:fld>
             <a:endParaRPr lang="en-US" dirty="0"/>
           </a:p>
@@ -3960,7 +3961,7 @@
             <a:fld id="{B61BEF0D-F0BB-DE4B-95CE-6DB70DBA9567}" type="datetimeFigureOut">
               <a:rPr lang="en-US" dirty="0"/>
               <a:pPr/>
-              <a:t>6/29/21</a:t>
+              <a:t>6/30/21</a:t>
             </a:fld>
             <a:endParaRPr lang="en-US" dirty="0"/>
           </a:p>
@@ -4162,7 +4163,7 @@
             <a:fld id="{B61BEF0D-F0BB-DE4B-95CE-6DB70DBA9567}" type="datetimeFigureOut">
               <a:rPr lang="en-US" dirty="0"/>
               <a:pPr/>
-              <a:t>6/29/21</a:t>
+              <a:t>6/30/21</a:t>
             </a:fld>
             <a:endParaRPr lang="en-US" dirty="0"/>
           </a:p>
@@ -4336,7 +4337,7 @@
             <a:fld id="{B61BEF0D-F0BB-DE4B-95CE-6DB70DBA9567}" type="datetimeFigureOut">
               <a:rPr lang="en-US" dirty="0"/>
               <a:pPr/>
-              <a:t>6/29/21</a:t>
+              <a:t>6/30/21</a:t>
             </a:fld>
             <a:endParaRPr lang="en-US" dirty="0"/>
           </a:p>
@@ -4666,7 +4667,7 @@
             <a:fld id="{B61BEF0D-F0BB-DE4B-95CE-6DB70DBA9567}" type="datetimeFigureOut">
               <a:rPr lang="en-US" dirty="0"/>
               <a:pPr/>
-              <a:t>6/29/21</a:t>
+              <a:t>6/30/21</a:t>
             </a:fld>
             <a:endParaRPr lang="en-US" dirty="0"/>
           </a:p>
@@ -5008,7 +5009,7 @@
             <a:fld id="{B61BEF0D-F0BB-DE4B-95CE-6DB70DBA9567}" type="datetimeFigureOut">
               <a:rPr lang="en-US" dirty="0"/>
               <a:pPr/>
-              <a:t>6/29/21</a:t>
+              <a:t>6/30/21</a:t>
             </a:fld>
             <a:endParaRPr lang="en-US" dirty="0"/>
           </a:p>
@@ -7122,7 +7123,7 @@
             <a:fld id="{B61BEF0D-F0BB-DE4B-95CE-6DB70DBA9567}" type="datetimeFigureOut">
               <a:rPr lang="en-US" dirty="0"/>
               <a:pPr/>
-              <a:t>6/29/21</a:t>
+              <a:t>6/30/21</a:t>
             </a:fld>
             <a:endParaRPr lang="en-US" dirty="0"/>
           </a:p>
@@ -8048,6 +8049,89 @@
 </p:sld>
 </file>
 
+<file path=ppt/slides/slide13.xml><?xml version="1.0" encoding="utf-8"?>
+<p:sld xmlns:a="http://schemas.openxmlformats.org/drawingml/2006/main" xmlns:r="http://schemas.openxmlformats.org/officeDocument/2006/relationships" xmlns:p="http://schemas.openxmlformats.org/presentationml/2006/main">
+  <p:cSld>
+    <p:spTree>
+      <p:nvGrpSpPr>
+        <p:cNvPr id="1" name=""/>
+        <p:cNvGrpSpPr/>
+        <p:nvPr/>
+      </p:nvGrpSpPr>
+      <p:grpSpPr>
+        <a:xfrm>
+          <a:off x="0" y="0"/>
+          <a:ext cx="0" cy="0"/>
+          <a:chOff x="0" y="0"/>
+          <a:chExt cx="0" cy="0"/>
+        </a:xfrm>
+      </p:grpSpPr>
+      <p:sp>
+        <p:nvSpPr>
+          <p:cNvPr id="2" name="标题 1">
+            <a:extLst>
+              <a:ext uri="{FF2B5EF4-FFF2-40B4-BE49-F238E27FC236}">
+                <a16:creationId xmlns:a16="http://schemas.microsoft.com/office/drawing/2014/main" id="{9805A8D3-8490-9B4D-BDAF-5EBC1A67A2F7}"/>
+              </a:ext>
+            </a:extLst>
+          </p:cNvPr>
+          <p:cNvSpPr>
+            <a:spLocks noGrp="1"/>
+          </p:cNvSpPr>
+          <p:nvPr>
+            <p:ph type="title"/>
+          </p:nvPr>
+        </p:nvSpPr>
+        <p:spPr/>
+        <p:txBody>
+          <a:bodyPr/>
+          <a:lstStyle/>
+          <a:p>
+            <a:r>
+              <a:rPr kumimoji="1" lang="zh-CN" altLang="en-US" dirty="0"/>
+              <a:t>零拷贝技术</a:t>
+            </a:r>
+          </a:p>
+        </p:txBody>
+      </p:sp>
+      <p:sp>
+        <p:nvSpPr>
+          <p:cNvPr id="3" name="内容占位符 2">
+            <a:extLst>
+              <a:ext uri="{FF2B5EF4-FFF2-40B4-BE49-F238E27FC236}">
+                <a16:creationId xmlns:a16="http://schemas.microsoft.com/office/drawing/2014/main" id="{1ED2349A-2884-8B44-B897-24ACBBF12CF0}"/>
+              </a:ext>
+            </a:extLst>
+          </p:cNvPr>
+          <p:cNvSpPr>
+            <a:spLocks noGrp="1"/>
+          </p:cNvSpPr>
+          <p:nvPr>
+            <p:ph idx="1"/>
+          </p:nvPr>
+        </p:nvSpPr>
+        <p:spPr/>
+        <p:txBody>
+          <a:bodyPr/>
+          <a:lstStyle/>
+          <a:p>
+            <a:endParaRPr kumimoji="1" lang="zh-CN" altLang="en-US" dirty="0"/>
+          </a:p>
+        </p:txBody>
+      </p:sp>
+    </p:spTree>
+    <p:extLst>
+      <p:ext uri="{BB962C8B-B14F-4D97-AF65-F5344CB8AC3E}">
+        <p14:creationId xmlns:p14="http://schemas.microsoft.com/office/powerpoint/2010/main" val="3591593763"/>
+      </p:ext>
+    </p:extLst>
+  </p:cSld>
+  <p:clrMapOvr>
+    <a:masterClrMapping/>
+  </p:clrMapOvr>
+</p:sld>
+</file>
+
 <file path=ppt/slides/slide2.xml><?xml version="1.0" encoding="utf-8"?>
 <p:sld xmlns:a="http://schemas.openxmlformats.org/drawingml/2006/main" xmlns:r="http://schemas.openxmlformats.org/officeDocument/2006/relationships" xmlns:p="http://schemas.openxmlformats.org/presentationml/2006/main">
   <p:cSld>

</xml_diff>